<commit_message>
🚧 create void Matrix2DIdentity(Matrix2D* pResult)
// This function sets the matrix equal to the identity matrix.
</commit_message>
<xml_diff>
--- a/Project 3 - Lecture.pptx
+++ b/Project 3 - Lecture.pptx
@@ -13696,13 +13696,21 @@
           <a:lstStyle/>
           <a:p>
             <a:r>
-              <a:rPr lang="en-US" dirty="0"/>
+              <a:rPr lang="en-US" dirty="0">
+                <a:highlight>
+                  <a:srgbClr val="00FF00"/>
+                </a:highlight>
+              </a:rPr>
               <a:t>Unzip the Project 3 materials into a clean folder</a:t>
             </a:r>
           </a:p>
           <a:p>
             <a:r>
-              <a:rPr lang="en-US" dirty="0"/>
+              <a:rPr lang="en-US" dirty="0">
+                <a:highlight>
+                  <a:srgbClr val="00FF00"/>
+                </a:highlight>
+              </a:rPr>
               <a:t>Add and commit the files to version control</a:t>
             </a:r>
           </a:p>
@@ -13859,13 +13867,21 @@
           <a:lstStyle/>
           <a:p>
             <a:r>
-              <a:rPr lang="en-US" dirty="0"/>
+              <a:rPr lang="en-US" dirty="0">
+                <a:highlight>
+                  <a:srgbClr val="00FF00"/>
+                </a:highlight>
+              </a:rPr>
               <a:t>Integrate code from Project 2 into Project 3</a:t>
             </a:r>
           </a:p>
           <a:p>
             <a:r>
-              <a:rPr lang="en-US" dirty="0"/>
+              <a:rPr lang="en-US" dirty="0">
+                <a:highlight>
+                  <a:srgbClr val="00FF00"/>
+                </a:highlight>
+              </a:rPr>
               <a:t>Create new .c modules and add stub functions</a:t>
             </a:r>
           </a:p>
@@ -13878,7 +13894,11 @@
           </a:p>
           <a:p>
             <a:r>
-              <a:rPr lang="en-US" dirty="0"/>
+              <a:rPr lang="en-US" dirty="0">
+                <a:highlight>
+                  <a:srgbClr val="00FF00"/>
+                </a:highlight>
+              </a:rPr>
               <a:t>Add temporary return values and unreferenced parameter macros as necessary to compile the code</a:t>
             </a:r>
           </a:p>
@@ -13891,7 +13911,11 @@
           </a:p>
           <a:p>
             <a:r>
-              <a:rPr lang="en-US" dirty="0"/>
+              <a:rPr lang="en-US" dirty="0">
+                <a:highlight>
+                  <a:srgbClr val="00FF00"/>
+                </a:highlight>
+              </a:rPr>
               <a:t>Add and commit the files to version control</a:t>
             </a:r>
           </a:p>

</xml_diff>

<commit_message>
✨ Complete Matrix2D.c function implementations
</commit_message>
<xml_diff>
--- a/Project 3 - Lecture.pptx
+++ b/Project 3 - Lecture.pptx
@@ -14064,35 +14064,55 @@
           <a:p>
             <a:pPr lvl="1"/>
             <a:r>
-              <a:rPr lang="en-US" dirty="0"/>
+              <a:rPr lang="en-US" dirty="0">
+                <a:highlight>
+                  <a:srgbClr val="00FF00"/>
+                </a:highlight>
+              </a:rPr>
               <a:t>Implement the Matrix2DIdentity function</a:t>
             </a:r>
           </a:p>
           <a:p>
             <a:pPr lvl="1"/>
             <a:r>
-              <a:rPr lang="en-US" dirty="0"/>
+              <a:rPr lang="en-US" dirty="0">
+                <a:highlight>
+                  <a:srgbClr val="00FF00"/>
+                </a:highlight>
+              </a:rPr>
               <a:t>Implement the Matrix2DTranslate, Scale, and Rot* functions</a:t>
             </a:r>
           </a:p>
           <a:p>
             <a:pPr lvl="1"/>
             <a:r>
-              <a:rPr lang="en-US" dirty="0"/>
+              <a:rPr lang="en-US" dirty="0">
+                <a:highlight>
+                  <a:srgbClr val="00FF00"/>
+                </a:highlight>
+              </a:rPr>
               <a:t>Implement the Matrix2DConcat function</a:t>
             </a:r>
           </a:p>
           <a:p>
             <a:pPr lvl="1"/>
             <a:r>
-              <a:rPr lang="en-US" dirty="0"/>
+              <a:rPr lang="en-US" dirty="0">
+                <a:highlight>
+                  <a:srgbClr val="00FF00"/>
+                </a:highlight>
+              </a:rPr>
               <a:t>Implement the remaining functions at any time</a:t>
             </a:r>
           </a:p>
           <a:p>
             <a:pPr lvl="2"/>
             <a:r>
-              <a:rPr lang="en-US" dirty="0"/>
+              <a:rPr lang="en-US" dirty="0">
+                <a:highlight>
+                  <a:srgbClr val="FFFF00"/>
+                </a:highlight>
+              </a:rPr>
               <a:t>Make sure to test every single function!</a:t>
             </a:r>
           </a:p>

</xml_diff>

<commit_message>
🚧 create Level1Scene structure and Load function
</commit_message>
<xml_diff>
--- a/Project 3 - Lecture.pptx
+++ b/Project 3 - Lecture.pptx
@@ -5980,7 +5980,7 @@
             <a:r>
               <a:rPr lang="en-US" dirty="0">
                 <a:highlight>
-                  <a:srgbClr val="FFFF00"/>
+                  <a:srgbClr val="00FF00"/>
                 </a:highlight>
               </a:rPr>
               <a:t>Verify that both colored and textured meshes are still drawn correctly</a:t>
@@ -6178,7 +6178,11 @@
           <a:p>
             <a:pPr lvl="1"/>
             <a:r>
-              <a:rPr lang="en-US" dirty="0"/>
+              <a:rPr lang="en-US" dirty="0">
+                <a:highlight>
+                  <a:srgbClr val="00FF00"/>
+                </a:highlight>
+              </a:rPr>
               <a:t>Change the Planet Entity from PlanetJump.txt to PlanetBounce.txt</a:t>
             </a:r>
           </a:p>

</xml_diff>

<commit_message>
✅ Finish Animation.c file implementation
</commit_message>
<xml_diff>
--- a/Project 3 - Lecture.pptx
+++ b/Project 3 - Lecture.pptx
@@ -6396,7 +6396,11 @@
           <a:p>
             <a:pPr lvl="1"/>
             <a:r>
-              <a:rPr lang="en-US" dirty="0"/>
+              <a:rPr lang="en-US" dirty="0">
+                <a:highlight>
+                  <a:srgbClr val="00FF00"/>
+                </a:highlight>
+              </a:rPr>
               <a:t>Implement the Create, Read, and Free functions</a:t>
             </a:r>
           </a:p>

</xml_diff>

<commit_message>
🔧 Update Entity.c to handle animations
</commit_message>
<xml_diff>
--- a/Project 3 - Lecture.pptx
+++ b/Project 3 - Lecture.pptx
@@ -6189,29 +6189,49 @@
           <a:p>
             <a:pPr lvl="1"/>
             <a:r>
-              <a:rPr lang="en-US" dirty="0"/>
+              <a:rPr lang="en-US" dirty="0">
+                <a:highlight>
+                  <a:srgbClr val="00FF00"/>
+                </a:highlight>
+              </a:rPr>
               <a:t>Implement Level1SceneBounceController</a:t>
             </a:r>
           </a:p>
           <a:p>
             <a:pPr lvl="1"/>
             <a:r>
-              <a:rPr lang="en-US" dirty="0"/>
+              <a:rPr lang="en-US" dirty="0">
+                <a:highlight>
+                  <a:srgbClr val="00FF00"/>
+                </a:highlight>
+              </a:rPr>
               <a:t>Pass the Planet Entity into the new controller</a:t>
             </a:r>
           </a:p>
           <a:p>
             <a:pPr lvl="2"/>
             <a:r>
-              <a:rPr lang="en-US" i="1" dirty="0"/>
+              <a:rPr lang="en-US" i="1" dirty="0">
+                <a:highlight>
+                  <a:srgbClr val="FFFF00"/>
+                </a:highlight>
+              </a:rPr>
               <a:t>Note: You may need to temporarily comment out the existing controller for now</a:t>
             </a:r>
-            <a:endParaRPr lang="en-US" dirty="0"/>
+            <a:endParaRPr lang="en-US" dirty="0">
+              <a:highlight>
+                <a:srgbClr val="FFFF00"/>
+              </a:highlight>
+            </a:endParaRPr>
           </a:p>
           <a:p>
             <a:pPr lvl="1"/>
             <a:r>
-              <a:rPr lang="en-US" dirty="0"/>
+              <a:rPr lang="en-US" dirty="0">
+                <a:highlight>
+                  <a:srgbClr val="FFFF00"/>
+                </a:highlight>
+              </a:rPr>
               <a:t>Verify that the Planet spawns in the correct location and bounces around within an invisible “box”</a:t>
             </a:r>
           </a:p>
@@ -6594,21 +6614,33 @@
           <a:p>
             <a:pPr lvl="1"/>
             <a:r>
-              <a:rPr lang="en-US" dirty="0"/>
+              <a:rPr lang="en-US" dirty="0">
+                <a:highlight>
+                  <a:srgbClr val="00FF00"/>
+                </a:highlight>
+              </a:rPr>
               <a:t>Implement the code to create the new Monkey Entity</a:t>
             </a:r>
           </a:p>
           <a:p>
             <a:pPr lvl="1"/>
             <a:r>
-              <a:rPr lang="en-US" dirty="0"/>
+              <a:rPr lang="en-US" dirty="0">
+                <a:highlight>
+                  <a:srgbClr val="00FF00"/>
+                </a:highlight>
+              </a:rPr>
               <a:t>Use Level1SceneMovementController to move the Monkey</a:t>
             </a:r>
           </a:p>
           <a:p>
             <a:pPr lvl="1"/>
             <a:r>
-              <a:rPr lang="en-US" dirty="0"/>
+              <a:rPr lang="en-US" dirty="0">
+                <a:highlight>
+                  <a:srgbClr val="FFFF00"/>
+                </a:highlight>
+              </a:rPr>
               <a:t>Verify that the Monkey moves correctly</a:t>
             </a:r>
           </a:p>
@@ -6793,15 +6825,27 @@
           <a:p>
             <a:pPr lvl="1"/>
             <a:r>
-              <a:rPr lang="en-US" dirty="0"/>
+              <a:rPr lang="en-US" dirty="0">
+                <a:highlight>
+                  <a:srgbClr val="00FF00"/>
+                </a:highlight>
+              </a:rPr>
               <a:t>Implement the Play, Update and </a:t>
             </a:r>
             <a:r>
-              <a:rPr lang="en-US" dirty="0" err="1"/>
+              <a:rPr lang="en-US" dirty="0" err="1">
+                <a:highlight>
+                  <a:srgbClr val="00FF00"/>
+                </a:highlight>
+              </a:rPr>
               <a:t>IsDone</a:t>
             </a:r>
             <a:r>
-              <a:rPr lang="en-US" dirty="0"/>
+              <a:rPr lang="en-US" dirty="0">
+                <a:highlight>
+                  <a:srgbClr val="00FF00"/>
+                </a:highlight>
+              </a:rPr>
               <a:t> functions</a:t>
             </a:r>
           </a:p>
@@ -7410,42 +7454,66 @@
           <a:p>
             <a:pPr lvl="1"/>
             <a:r>
-              <a:rPr lang="en-US" dirty="0"/>
+              <a:rPr lang="en-US" dirty="0">
+                <a:highlight>
+                  <a:srgbClr val="00FF00"/>
+                </a:highlight>
+              </a:rPr>
               <a:t>Implement the Level1SceneSetMonkeyState function</a:t>
             </a:r>
           </a:p>
           <a:p>
             <a:pPr lvl="1"/>
             <a:r>
-              <a:rPr lang="en-US" dirty="0"/>
+              <a:rPr lang="en-US" dirty="0">
+                <a:highlight>
+                  <a:srgbClr val="00FF00"/>
+                </a:highlight>
+              </a:rPr>
               <a:t>Update Level1SceneMovementController to control the Monkey’s current state</a:t>
             </a:r>
           </a:p>
           <a:p>
             <a:pPr lvl="1"/>
             <a:r>
-              <a:rPr lang="en-US" dirty="0"/>
+              <a:rPr lang="en-US" dirty="0">
+                <a:highlight>
+                  <a:srgbClr val="00FF00"/>
+                </a:highlight>
+              </a:rPr>
               <a:t>Implement any remaining animation functionality</a:t>
             </a:r>
           </a:p>
           <a:p>
             <a:pPr lvl="2"/>
             <a:r>
-              <a:rPr lang="en-US" dirty="0"/>
+              <a:rPr lang="en-US" dirty="0">
+                <a:highlight>
+                  <a:srgbClr val="FFFF00"/>
+                </a:highlight>
+              </a:rPr>
               <a:t>E.G. Correctly load and unload all sprite sources</a:t>
             </a:r>
           </a:p>
           <a:p>
             <a:pPr lvl="1"/>
             <a:r>
-              <a:rPr lang="en-US" dirty="0"/>
+              <a:rPr lang="en-US" dirty="0">
+                <a:highlight>
+                  <a:srgbClr val="FFFF00"/>
+                </a:highlight>
+              </a:rPr>
               <a:t>Verify that the Monkey continues to move properly</a:t>
             </a:r>
           </a:p>
           <a:p>
             <a:pPr lvl="1"/>
             <a:r>
-              <a:rPr lang="en-US" dirty="0"/>
+              <a:rPr lang="en-US" dirty="0">
+                <a:highlight>
+                  <a:srgbClr val="FFFF00"/>
+                </a:highlight>
+              </a:rPr>
               <a:t>Verify that the Monkey animates properly in all states</a:t>
             </a:r>
           </a:p>
@@ -7642,29 +7710,49 @@
           <a:p>
             <a:pPr lvl="1"/>
             <a:r>
-              <a:rPr lang="en-US" dirty="0"/>
+              <a:rPr lang="en-US" dirty="0">
+                <a:highlight>
+                  <a:srgbClr val="00FF00"/>
+                </a:highlight>
+              </a:rPr>
               <a:t>Implement Level1SceneIsColliding</a:t>
             </a:r>
           </a:p>
           <a:p>
             <a:pPr lvl="1"/>
             <a:r>
-              <a:rPr lang="en-US" dirty="0"/>
+              <a:rPr lang="en-US" dirty="0">
+                <a:highlight>
+                  <a:srgbClr val="00FF00"/>
+                </a:highlight>
+              </a:rPr>
               <a:t>Implement logic to detect when the two objects are colliding</a:t>
             </a:r>
           </a:p>
           <a:p>
             <a:pPr lvl="2"/>
             <a:r>
-              <a:rPr lang="en-US" dirty="0"/>
+              <a:rPr lang="en-US" dirty="0">
+                <a:highlight>
+                  <a:srgbClr val="FFFF00"/>
+                </a:highlight>
+              </a:rPr>
               <a:t>Update </a:t>
             </a:r>
             <a:r>
-              <a:rPr lang="en-US" dirty="0" err="1"/>
+              <a:rPr lang="en-US" dirty="0" err="1">
+                <a:highlight>
+                  <a:srgbClr val="FFFF00"/>
+                </a:highlight>
+              </a:rPr>
               <a:t>numLives</a:t>
             </a:r>
             <a:r>
-              <a:rPr lang="en-US" dirty="0"/>
+              <a:rPr lang="en-US" dirty="0">
+                <a:highlight>
+                  <a:srgbClr val="FFFF00"/>
+                </a:highlight>
+              </a:rPr>
               <a:t> appropriately</a:t>
             </a:r>
           </a:p>

</xml_diff>

<commit_message>
✅ Finish changes for Sprite.c
</commit_message>
<xml_diff>
--- a/Project 3 - Lecture.pptx
+++ b/Project 3 - Lecture.pptx
@@ -8064,27 +8064,51 @@
           <a:p>
             <a:pPr lvl="1"/>
             <a:r>
-              <a:rPr lang="en-US" dirty="0"/>
+              <a:rPr lang="en-US" dirty="0">
+                <a:highlight>
+                  <a:srgbClr val="00FF00"/>
+                </a:highlight>
+              </a:rPr>
               <a:t>Implement </a:t>
             </a:r>
             <a:r>
-              <a:rPr lang="en-US" dirty="0" err="1"/>
+              <a:rPr lang="en-US" dirty="0" err="1">
+                <a:highlight>
+                  <a:srgbClr val="00FF00"/>
+                </a:highlight>
+              </a:rPr>
               <a:t>SpriteSetText</a:t>
             </a:r>
-            <a:endParaRPr lang="en-US" dirty="0"/>
+            <a:endParaRPr lang="en-US" dirty="0">
+              <a:highlight>
+                <a:srgbClr val="00FF00"/>
+              </a:highlight>
+            </a:endParaRPr>
           </a:p>
           <a:p>
             <a:pPr lvl="1"/>
             <a:r>
-              <a:rPr lang="en-US" dirty="0"/>
+              <a:rPr lang="en-US" dirty="0">
+                <a:highlight>
+                  <a:srgbClr val="00FF00"/>
+                </a:highlight>
+              </a:rPr>
               <a:t>Modify </a:t>
             </a:r>
             <a:r>
-              <a:rPr lang="en-US" dirty="0" err="1"/>
+              <a:rPr lang="en-US" dirty="0" err="1">
+                <a:highlight>
+                  <a:srgbClr val="00FF00"/>
+                </a:highlight>
+              </a:rPr>
               <a:t>SpriteRender</a:t>
             </a:r>
             <a:r>
-              <a:rPr lang="en-US" dirty="0"/>
+              <a:rPr lang="en-US" dirty="0">
+                <a:highlight>
+                  <a:srgbClr val="00FF00"/>
+                </a:highlight>
+              </a:rPr>
               <a:t> to now display sprite text</a:t>
             </a:r>
           </a:p>

</xml_diff>

<commit_message>
✨ Implement Cheat System for Scene navigation
</commit_message>
<xml_diff>
--- a/Project 3 - Lecture.pptx
+++ b/Project 3 - Lecture.pptx
@@ -8280,45 +8280,81 @@
           <a:p>
             <a:pPr lvl="1"/>
             <a:r>
-              <a:rPr lang="en-US" dirty="0"/>
+              <a:rPr lang="en-US" dirty="0">
+                <a:highlight>
+                  <a:srgbClr val="00FF00"/>
+                </a:highlight>
+              </a:rPr>
               <a:t>Implement the </a:t>
             </a:r>
             <a:r>
-              <a:rPr lang="en-US" dirty="0" err="1"/>
+              <a:rPr lang="en-US" dirty="0" err="1">
+                <a:highlight>
+                  <a:srgbClr val="00FF00"/>
+                </a:highlight>
+              </a:rPr>
               <a:t>LivesText</a:t>
             </a:r>
             <a:r>
-              <a:rPr lang="en-US" dirty="0"/>
+              <a:rPr lang="en-US" dirty="0">
+                <a:highlight>
+                  <a:srgbClr val="00FF00"/>
+                </a:highlight>
+              </a:rPr>
               <a:t> Entity, including all supporting assets, variables, and clean-up code</a:t>
             </a:r>
           </a:p>
           <a:p>
             <a:pPr lvl="1"/>
             <a:r>
-              <a:rPr lang="en-US" dirty="0"/>
+              <a:rPr lang="en-US" dirty="0">
+                <a:highlight>
+                  <a:srgbClr val="00FF00"/>
+                </a:highlight>
+              </a:rPr>
               <a:t>Add code to update the </a:t>
             </a:r>
             <a:r>
-              <a:rPr lang="en-US" dirty="0" err="1"/>
+              <a:rPr lang="en-US" dirty="0" err="1">
+                <a:highlight>
+                  <a:srgbClr val="00FF00"/>
+                </a:highlight>
+              </a:rPr>
               <a:t>livesBuffer</a:t>
             </a:r>
             <a:r>
-              <a:rPr lang="en-US" dirty="0"/>
+              <a:rPr lang="en-US" dirty="0">
+                <a:highlight>
+                  <a:srgbClr val="00FF00"/>
+                </a:highlight>
+              </a:rPr>
               <a:t> when </a:t>
             </a:r>
             <a:r>
-              <a:rPr lang="en-US" dirty="0" err="1"/>
+              <a:rPr lang="en-US" dirty="0" err="1">
+                <a:highlight>
+                  <a:srgbClr val="00FF00"/>
+                </a:highlight>
+              </a:rPr>
               <a:t>numLives</a:t>
             </a:r>
             <a:r>
-              <a:rPr lang="en-US" dirty="0"/>
+              <a:rPr lang="en-US" dirty="0">
+                <a:highlight>
+                  <a:srgbClr val="00FF00"/>
+                </a:highlight>
+              </a:rPr>
               <a:t> changes</a:t>
             </a:r>
           </a:p>
           <a:p>
             <a:pPr lvl="1"/>
             <a:r>
-              <a:rPr lang="en-US" dirty="0"/>
+              <a:rPr lang="en-US" dirty="0">
+                <a:highlight>
+                  <a:srgbClr val="FFFF00"/>
+                </a:highlight>
+              </a:rPr>
               <a:t>Verify that the text changes each time the Monkey “collides” with the Planet</a:t>
             </a:r>
           </a:p>
@@ -8503,15 +8539,27 @@
           <a:p>
             <a:pPr lvl="1"/>
             <a:r>
-              <a:rPr lang="en-US" dirty="0"/>
+              <a:rPr lang="en-US" dirty="0">
+                <a:highlight>
+                  <a:srgbClr val="00FF00"/>
+                </a:highlight>
+              </a:rPr>
               <a:t>Implemented the </a:t>
             </a:r>
             <a:r>
-              <a:rPr lang="en-US" dirty="0" err="1"/>
+              <a:rPr lang="en-US" dirty="0" err="1">
+                <a:highlight>
+                  <a:srgbClr val="00FF00"/>
+                </a:highlight>
+              </a:rPr>
               <a:t>CheatSystem</a:t>
             </a:r>
             <a:r>
-              <a:rPr lang="en-US" dirty="0"/>
+              <a:rPr lang="en-US" dirty="0">
+                <a:highlight>
+                  <a:srgbClr val="00FF00"/>
+                </a:highlight>
+              </a:rPr>
               <a:t> functionality</a:t>
             </a:r>
           </a:p>

</xml_diff>

<commit_message>
✅ Complete Cheat System implementation
</commit_message>
<xml_diff>
--- a/Project 3 - Lecture.pptx
+++ b/Project 3 - Lecture.pptx
@@ -8573,15 +8573,27 @@
           <a:p>
             <a:pPr lvl="1"/>
             <a:r>
-              <a:rPr lang="en-US" dirty="0"/>
+              <a:rPr lang="en-US" dirty="0">
+                <a:highlight>
+                  <a:srgbClr val="00FF00"/>
+                </a:highlight>
+              </a:rPr>
               <a:t>Add </a:t>
             </a:r>
             <a:r>
-              <a:rPr lang="en-US" dirty="0" err="1"/>
+              <a:rPr lang="en-US" dirty="0" err="1">
+                <a:highlight>
+                  <a:srgbClr val="00FF00"/>
+                </a:highlight>
+              </a:rPr>
               <a:t>CheatSystem</a:t>
             </a:r>
             <a:r>
-              <a:rPr lang="en-US" dirty="0"/>
+              <a:rPr lang="en-US" dirty="0">
+                <a:highlight>
+                  <a:srgbClr val="00FF00"/>
+                </a:highlight>
+              </a:rPr>
               <a:t> to the engine</a:t>
             </a:r>
           </a:p>
@@ -8595,7 +8607,11 @@
           <a:p>
             <a:pPr lvl="1"/>
             <a:r>
-              <a:rPr lang="en-US" dirty="0"/>
+              <a:rPr lang="en-US" dirty="0">
+                <a:highlight>
+                  <a:srgbClr val="00FF00"/>
+                </a:highlight>
+              </a:rPr>
               <a:t>Remove the existing, copy-and-paste cheat code</a:t>
             </a:r>
           </a:p>

</xml_diff>

<commit_message>
🔧 Fix CheatSystem Update so that it restarts the current level if that key is pressed
</commit_message>
<xml_diff>
--- a/Project 3 - Lecture.pptx
+++ b/Project 3 - Lecture.pptx
@@ -285,7 +285,7 @@
             <a:fld id="{9CE4D9B5-C23F-4F5B-A510-223EE943FD84}" type="datetimeFigureOut">
               <a:rPr lang="en-US" smtClean="0"/>
               <a:pPr/>
-              <a:t>2/13/2025</a:t>
+              <a:t>2/20/2025</a:t>
             </a:fld>
             <a:endParaRPr lang="en-US"/>
           </a:p>
@@ -872,7 +872,7 @@
             <a:fld id="{CC5FAB66-F69F-4B6C-B526-16B5B129EADB}" type="datetime1">
               <a:rPr lang="en-US" smtClean="0"/>
               <a:pPr/>
-              <a:t>2/13/2025</a:t>
+              <a:t>2/20/2025</a:t>
             </a:fld>
             <a:endParaRPr lang="en-US" dirty="0"/>
           </a:p>
@@ -1276,7 +1276,7 @@
             <a:fld id="{818F3258-39DB-480D-AA11-E1EF94FC4695}" type="datetime1">
               <a:rPr lang="en-US" smtClean="0"/>
               <a:pPr/>
-              <a:t>2/13/2025</a:t>
+              <a:t>2/20/2025</a:t>
             </a:fld>
             <a:endParaRPr lang="en-US" dirty="0"/>
           </a:p>
@@ -1454,7 +1454,7 @@
             <a:fld id="{AEC8A4F3-ED06-48DC-8481-6B075B3F12EC}" type="datetime1">
               <a:rPr lang="en-US" smtClean="0"/>
               <a:pPr/>
-              <a:t>2/13/2025</a:t>
+              <a:t>2/20/2025</a:t>
             </a:fld>
             <a:endParaRPr lang="en-US" dirty="0"/>
           </a:p>
@@ -1718,7 +1718,7 @@
             <a:fld id="{409124BB-FC4B-4459-9E83-B488936AD7B8}" type="datetime1">
               <a:rPr lang="en-US" smtClean="0"/>
               <a:pPr/>
-              <a:t>2/13/2025</a:t>
+              <a:t>2/20/2025</a:t>
             </a:fld>
             <a:endParaRPr lang="en-US" dirty="0"/>
           </a:p>
@@ -2088,7 +2088,7 @@
             <a:fld id="{AE645E34-4EAE-44C6-A808-8E7619B5FCEA}" type="datetime1">
               <a:rPr lang="en-US" smtClean="0"/>
               <a:pPr/>
-              <a:t>2/13/2025</a:t>
+              <a:t>2/20/2025</a:t>
             </a:fld>
             <a:endParaRPr lang="en-US" dirty="0"/>
           </a:p>
@@ -2458,7 +2458,7 @@
             <a:fld id="{7EC34C66-FE28-425E-8208-CF7EDC8DF363}" type="datetime1">
               <a:rPr lang="en-US" smtClean="0"/>
               <a:pPr/>
-              <a:t>2/13/2025</a:t>
+              <a:t>2/20/2025</a:t>
             </a:fld>
             <a:endParaRPr lang="en-US" dirty="0"/>
           </a:p>
@@ -2809,7 +2809,7 @@
             <a:fld id="{0444DE73-A3F0-436D-9600-1A6E66F9FFEF}" type="datetime1">
               <a:rPr lang="en-US" smtClean="0"/>
               <a:pPr/>
-              <a:t>2/13/2025</a:t>
+              <a:t>2/20/2025</a:t>
             </a:fld>
             <a:endParaRPr lang="en-US" dirty="0"/>
           </a:p>
@@ -3091,7 +3091,7 @@
             <a:fld id="{FF58DBF8-50A7-4BC0-9320-D3D97C2642BE}" type="datetime1">
               <a:rPr lang="en-US" smtClean="0"/>
               <a:pPr/>
-              <a:t>2/13/2025</a:t>
+              <a:t>2/20/2025</a:t>
             </a:fld>
             <a:endParaRPr lang="en-US" dirty="0"/>
           </a:p>
@@ -3477,7 +3477,7 @@
             <a:fld id="{3B7CFFA9-120C-49D9-8B33-3C2B12A8DBA4}" type="datetime1">
               <a:rPr lang="en-US" smtClean="0"/>
               <a:pPr/>
-              <a:t>2/13/2025</a:t>
+              <a:t>2/20/2025</a:t>
             </a:fld>
             <a:endParaRPr lang="en-US" dirty="0"/>
           </a:p>
@@ -3603,7 +3603,7 @@
             <a:fld id="{5F74FA30-5998-4A94-AC07-116568D8E4BB}" type="datetime1">
               <a:rPr lang="en-US" smtClean="0"/>
               <a:pPr/>
-              <a:t>2/13/2025</a:t>
+              <a:t>2/20/2025</a:t>
             </a:fld>
             <a:endParaRPr lang="en-US" dirty="0"/>
           </a:p>
@@ -3782,7 +3782,7 @@
             <a:fld id="{7B0B7851-DAC7-4535-82A8-F9F52B85F021}" type="datetime1">
               <a:rPr lang="en-US" smtClean="0"/>
               <a:pPr/>
-              <a:t>2/13/2025</a:t>
+              <a:t>2/20/2025</a:t>
             </a:fld>
             <a:endParaRPr lang="en-US" dirty="0"/>
           </a:p>
@@ -4144,7 +4144,7 @@
             <a:fld id="{58E9D1BF-3D47-4605-A719-999F5E730F58}" type="datetime1">
               <a:rPr lang="en-US" smtClean="0"/>
               <a:pPr/>
-              <a:t>2/13/2025</a:t>
+              <a:t>2/20/2025</a:t>
             </a:fld>
             <a:endParaRPr lang="en-US" dirty="0"/>
           </a:p>
@@ -4458,7 +4458,7 @@
             <a:fld id="{7832CE81-818F-4867-A81A-32FEBE6C803F}" type="datetime1">
               <a:rPr lang="en-US" smtClean="0"/>
               <a:pPr/>
-              <a:t>2/13/2025</a:t>
+              <a:t>2/20/2025</a:t>
             </a:fld>
             <a:endParaRPr lang="en-US" dirty="0"/>
           </a:p>
@@ -9614,26 +9614,22 @@
           <a:p>
             <a:pPr lvl="2"/>
             <a:r>
-              <a:rPr lang="en-US" dirty="0">
-                <a:highlight>
-                  <a:srgbClr val="FFFF00"/>
-                </a:highlight>
-              </a:rPr>
+              <a:rPr lang="en-US" dirty="0"/>
               <a:t>It is your responsibility to test </a:t>
             </a:r>
+            <a:r>
+              <a:rPr lang="en-US" i="1" dirty="0"/>
+              <a:t>every function!</a:t>
+            </a:r>
+          </a:p>
+          <a:p>
+            <a:pPr lvl="2"/>
             <a:r>
               <a:rPr lang="en-US" i="1" dirty="0">
                 <a:highlight>
                   <a:srgbClr val="FFFF00"/>
                 </a:highlight>
               </a:rPr>
-              <a:t>every function!</a:t>
-            </a:r>
-          </a:p>
-          <a:p>
-            <a:pPr lvl="2"/>
-            <a:r>
-              <a:rPr lang="en-US" i="1" dirty="0"/>
               <a:t>HINT: Every function will be graded using automated unit tests</a:t>
             </a:r>
           </a:p>

</xml_diff>